<commit_message>
for class2 without date
</commit_message>
<xml_diff>
--- a/images/image-source.pptx
+++ b/images/image-source.pptx
@@ -260,7 +260,7 @@
           <a:p>
             <a:fld id="{5AEDAD29-5430-4F9D-ADF7-A5E274566AD8}" type="datetimeFigureOut">
               <a:rPr lang="ko-KR" altLang="en-US" smtClean="0"/>
-              <a:t>2017-04-05</a:t>
+              <a:t>2017-04-12</a:t>
             </a:fld>
             <a:endParaRPr lang="ko-KR" altLang="en-US"/>
           </a:p>
@@ -428,7 +428,7 @@
           <a:p>
             <a:fld id="{5AEDAD29-5430-4F9D-ADF7-A5E274566AD8}" type="datetimeFigureOut">
               <a:rPr lang="ko-KR" altLang="en-US" smtClean="0"/>
-              <a:t>2017-04-05</a:t>
+              <a:t>2017-04-12</a:t>
             </a:fld>
             <a:endParaRPr lang="ko-KR" altLang="en-US"/>
           </a:p>
@@ -606,7 +606,7 @@
           <a:p>
             <a:fld id="{5AEDAD29-5430-4F9D-ADF7-A5E274566AD8}" type="datetimeFigureOut">
               <a:rPr lang="ko-KR" altLang="en-US" smtClean="0"/>
-              <a:t>2017-04-05</a:t>
+              <a:t>2017-04-12</a:t>
             </a:fld>
             <a:endParaRPr lang="ko-KR" altLang="en-US"/>
           </a:p>
@@ -774,7 +774,7 @@
           <a:p>
             <a:fld id="{5AEDAD29-5430-4F9D-ADF7-A5E274566AD8}" type="datetimeFigureOut">
               <a:rPr lang="ko-KR" altLang="en-US" smtClean="0"/>
-              <a:t>2017-04-05</a:t>
+              <a:t>2017-04-12</a:t>
             </a:fld>
             <a:endParaRPr lang="ko-KR" altLang="en-US"/>
           </a:p>
@@ -1019,7 +1019,7 @@
           <a:p>
             <a:fld id="{5AEDAD29-5430-4F9D-ADF7-A5E274566AD8}" type="datetimeFigureOut">
               <a:rPr lang="ko-KR" altLang="en-US" smtClean="0"/>
-              <a:t>2017-04-05</a:t>
+              <a:t>2017-04-12</a:t>
             </a:fld>
             <a:endParaRPr lang="ko-KR" altLang="en-US"/>
           </a:p>
@@ -1248,7 +1248,7 @@
           <a:p>
             <a:fld id="{5AEDAD29-5430-4F9D-ADF7-A5E274566AD8}" type="datetimeFigureOut">
               <a:rPr lang="ko-KR" altLang="en-US" smtClean="0"/>
-              <a:t>2017-04-05</a:t>
+              <a:t>2017-04-12</a:t>
             </a:fld>
             <a:endParaRPr lang="ko-KR" altLang="en-US"/>
           </a:p>
@@ -1612,7 +1612,7 @@
           <a:p>
             <a:fld id="{5AEDAD29-5430-4F9D-ADF7-A5E274566AD8}" type="datetimeFigureOut">
               <a:rPr lang="ko-KR" altLang="en-US" smtClean="0"/>
-              <a:t>2017-04-05</a:t>
+              <a:t>2017-04-12</a:t>
             </a:fld>
             <a:endParaRPr lang="ko-KR" altLang="en-US"/>
           </a:p>
@@ -1729,7 +1729,7 @@
           <a:p>
             <a:fld id="{5AEDAD29-5430-4F9D-ADF7-A5E274566AD8}" type="datetimeFigureOut">
               <a:rPr lang="ko-KR" altLang="en-US" smtClean="0"/>
-              <a:t>2017-04-05</a:t>
+              <a:t>2017-04-12</a:t>
             </a:fld>
             <a:endParaRPr lang="ko-KR" altLang="en-US"/>
           </a:p>
@@ -1824,7 +1824,7 @@
           <a:p>
             <a:fld id="{5AEDAD29-5430-4F9D-ADF7-A5E274566AD8}" type="datetimeFigureOut">
               <a:rPr lang="ko-KR" altLang="en-US" smtClean="0"/>
-              <a:t>2017-04-05</a:t>
+              <a:t>2017-04-12</a:t>
             </a:fld>
             <a:endParaRPr lang="ko-KR" altLang="en-US"/>
           </a:p>
@@ -2099,7 +2099,7 @@
           <a:p>
             <a:fld id="{5AEDAD29-5430-4F9D-ADF7-A5E274566AD8}" type="datetimeFigureOut">
               <a:rPr lang="ko-KR" altLang="en-US" smtClean="0"/>
-              <a:t>2017-04-05</a:t>
+              <a:t>2017-04-12</a:t>
             </a:fld>
             <a:endParaRPr lang="ko-KR" altLang="en-US"/>
           </a:p>
@@ -2351,7 +2351,7 @@
           <a:p>
             <a:fld id="{5AEDAD29-5430-4F9D-ADF7-A5E274566AD8}" type="datetimeFigureOut">
               <a:rPr lang="ko-KR" altLang="en-US" smtClean="0"/>
-              <a:t>2017-04-05</a:t>
+              <a:t>2017-04-12</a:t>
             </a:fld>
             <a:endParaRPr lang="ko-KR" altLang="en-US"/>
           </a:p>
@@ -2562,7 +2562,7 @@
           <a:p>
             <a:fld id="{5AEDAD29-5430-4F9D-ADF7-A5E274566AD8}" type="datetimeFigureOut">
               <a:rPr lang="ko-KR" altLang="en-US" smtClean="0"/>
-              <a:t>2017-04-05</a:t>
+              <a:t>2017-04-12</a:t>
             </a:fld>
             <a:endParaRPr lang="ko-KR" altLang="en-US"/>
           </a:p>
@@ -4980,6 +4980,29 @@
           <a:chExt cx="0" cy="0"/>
         </a:xfrm>
       </p:grpSpPr>
+      <p:pic>
+        <p:nvPicPr>
+          <p:cNvPr id="2" name="그림 1"/>
+          <p:cNvPicPr>
+            <a:picLocks noChangeAspect="1"/>
+          </p:cNvPicPr>
+          <p:nvPr/>
+        </p:nvPicPr>
+        <p:blipFill rotWithShape="1">
+          <a:blip r:embed="rId2"/>
+          <a:srcRect t="8847" r="51797" b="61745"/>
+          <a:stretch/>
+        </p:blipFill>
+        <p:spPr>
+          <a:xfrm>
+            <a:off x="2845749" y="2281726"/>
+            <a:ext cx="5876925" cy="2016809"/>
+          </a:xfrm>
+          <a:prstGeom prst="rect">
+            <a:avLst/>
+          </a:prstGeom>
+        </p:spPr>
+      </p:pic>
     </p:spTree>
     <p:extLst>
       <p:ext uri="{BB962C8B-B14F-4D97-AF65-F5344CB8AC3E}">

</xml_diff>